<commit_message>
Tela do personagem e dos talentos
Esqueletos de telas para os dados de cada personagem e para os talentos
prontos
</commit_message>
<xml_diff>
--- a/Semestre II - Apresentação III.pptx
+++ b/Semestre II - Apresentação III.pptx
@@ -3896,11 +3896,7 @@
             </a:br>
             <a:r>
               <a:rPr lang="pt-BR" sz="2400" smtClean="0"/>
-              <a:t>Checkpoint </a:t>
-            </a:r>
-            <a:r>
-              <a:rPr lang="pt-BR" sz="2400" smtClean="0"/>
-              <a:t>2</a:t>
+              <a:t>Checkpoint 2</a:t>
             </a:r>
             <a:endParaRPr lang="pt-BR" sz="4400" dirty="0"/>
           </a:p>
@@ -4289,7 +4285,6 @@
               <a:rPr lang="pt-BR" dirty="0" smtClean="0"/>
               <a:t>Finalização das etapas anteriores</a:t>
             </a:r>
-            <a:endParaRPr lang="pt-BR" dirty="0" smtClean="0"/>
           </a:p>
           <a:p>
             <a:r>
@@ -4613,15 +4608,7 @@
                   <a:schemeClr val="tx2"/>
                 </a:solidFill>
               </a:rPr>
-              <a:t>Contínuo </a:t>
-            </a:r>
-            <a:r>
-              <a:rPr lang="pt-BR" dirty="0" smtClean="0">
-                <a:solidFill>
-                  <a:schemeClr val="tx2"/>
-                </a:solidFill>
-              </a:rPr>
-              <a:t>em todas etapas</a:t>
+              <a:t>Contínuo em todas etapas</a:t>
             </a:r>
             <a:endParaRPr lang="pt-BR" dirty="0">
               <a:solidFill>

</xml_diff>